<commit_message>
Update powerpoint with "Composition over inheritance"
</commit_message>
<xml_diff>
--- a/ObjectCalisthenics.pptx
+++ b/ObjectCalisthenics.pptx
@@ -7,7 +7,7 @@
     <p:sldMasterId id="2147485416" r:id="rId6"/>
   </p:sldMasterIdLst>
   <p:notesMasterIdLst>
-    <p:notesMasterId r:id="rId30"/>
+    <p:notesMasterId r:id="rId34"/>
   </p:notesMasterIdLst>
   <p:sldIdLst>
     <p:sldId id="287" r:id="rId7"/>
@@ -32,7 +32,11 @@
     <p:sldId id="350" r:id="rId26"/>
     <p:sldId id="351" r:id="rId27"/>
     <p:sldId id="352" r:id="rId28"/>
-    <p:sldId id="308" r:id="rId29"/>
+    <p:sldId id="356" r:id="rId29"/>
+    <p:sldId id="357" r:id="rId30"/>
+    <p:sldId id="358" r:id="rId31"/>
+    <p:sldId id="359" r:id="rId32"/>
+    <p:sldId id="308" r:id="rId33"/>
   </p:sldIdLst>
   <p:sldSz cx="9144000" cy="6858000" type="screen4x3"/>
   <p:notesSz cx="6858000" cy="9144000"/>
@@ -1128,7 +1132,7 @@
               <a:pPr>
                 <a:defRPr/>
               </a:pPr>
-              <a:t>22/03/2024</a:t>
+              <a:t>23/03/2024</a:t>
             </a:fld>
             <a:endParaRPr lang="fr-FR" dirty="0"/>
           </a:p>
@@ -3130,6 +3134,462 @@
     <p:extLst>
       <p:ext uri="{BB962C8B-B14F-4D97-AF65-F5344CB8AC3E}">
         <p14:creationId xmlns:p14="http://schemas.microsoft.com/office/powerpoint/2010/main" val="3442753755"/>
+      </p:ext>
+    </p:extLst>
+  </p:cSld>
+  <p:clrMapOvr>
+    <a:masterClrMapping/>
+  </p:clrMapOvr>
+</p:notes>
+</file>
+
+<file path=ppt/notesSlides/notesSlide23.xml><?xml version="1.0" encoding="utf-8"?>
+<p:notes xmlns:a="http://schemas.openxmlformats.org/drawingml/2006/main" xmlns:r="http://schemas.openxmlformats.org/officeDocument/2006/relationships" xmlns:p="http://schemas.openxmlformats.org/presentationml/2006/main">
+  <p:cSld>
+    <p:spTree>
+      <p:nvGrpSpPr>
+        <p:cNvPr id="1" name="">
+          <a:extLst>
+            <a:ext uri="{FF2B5EF4-FFF2-40B4-BE49-F238E27FC236}">
+              <a16:creationId xmlns:a16="http://schemas.microsoft.com/office/drawing/2014/main" id="{7BBD71AC-E5DF-BAD4-8F22-9388D0315F50}"/>
+            </a:ext>
+          </a:extLst>
+        </p:cNvPr>
+        <p:cNvGrpSpPr/>
+        <p:nvPr/>
+      </p:nvGrpSpPr>
+      <p:grpSpPr>
+        <a:xfrm>
+          <a:off x="0" y="0"/>
+          <a:ext cx="0" cy="0"/>
+          <a:chOff x="0" y="0"/>
+          <a:chExt cx="0" cy="0"/>
+        </a:xfrm>
+      </p:grpSpPr>
+      <p:sp>
+        <p:nvSpPr>
+          <p:cNvPr id="2" name="Espace réservé de l'image des diapositives 1">
+            <a:extLst>
+              <a:ext uri="{FF2B5EF4-FFF2-40B4-BE49-F238E27FC236}">
+                <a16:creationId xmlns:a16="http://schemas.microsoft.com/office/drawing/2014/main" id="{75D06930-B4D4-7BFF-68B0-80D6696CFD7D}"/>
+              </a:ext>
+            </a:extLst>
+          </p:cNvPr>
+          <p:cNvSpPr>
+            <a:spLocks noGrp="1" noRot="1" noChangeAspect="1"/>
+          </p:cNvSpPr>
+          <p:nvPr>
+            <p:ph type="sldImg"/>
+          </p:nvPr>
+        </p:nvSpPr>
+        <p:spPr/>
+      </p:sp>
+      <p:sp>
+        <p:nvSpPr>
+          <p:cNvPr id="3" name="Espace réservé des notes 2">
+            <a:extLst>
+              <a:ext uri="{FF2B5EF4-FFF2-40B4-BE49-F238E27FC236}">
+                <a16:creationId xmlns:a16="http://schemas.microsoft.com/office/drawing/2014/main" id="{7FEDC592-8F08-D172-5E97-6B1ED66A9850}"/>
+              </a:ext>
+            </a:extLst>
+          </p:cNvPr>
+          <p:cNvSpPr>
+            <a:spLocks noGrp="1"/>
+          </p:cNvSpPr>
+          <p:nvPr>
+            <p:ph type="body" idx="1"/>
+          </p:nvPr>
+        </p:nvSpPr>
+        <p:spPr/>
+        <p:txBody>
+          <a:bodyPr/>
+          <a:lstStyle/>
+          <a:p>
+            <a:endParaRPr lang="en-US" dirty="0"/>
+          </a:p>
+        </p:txBody>
+      </p:sp>
+      <p:sp>
+        <p:nvSpPr>
+          <p:cNvPr id="4" name="Espace réservé du numéro de diapositive 3">
+            <a:extLst>
+              <a:ext uri="{FF2B5EF4-FFF2-40B4-BE49-F238E27FC236}">
+                <a16:creationId xmlns:a16="http://schemas.microsoft.com/office/drawing/2014/main" id="{5E240552-3579-8E0C-06D2-C95EDF94D32E}"/>
+              </a:ext>
+            </a:extLst>
+          </p:cNvPr>
+          <p:cNvSpPr>
+            <a:spLocks noGrp="1"/>
+          </p:cNvSpPr>
+          <p:nvPr>
+            <p:ph type="sldNum" sz="quarter" idx="10"/>
+          </p:nvPr>
+        </p:nvSpPr>
+        <p:spPr/>
+        <p:txBody>
+          <a:bodyPr/>
+          <a:lstStyle/>
+          <a:p>
+            <a:pPr>
+              <a:defRPr/>
+            </a:pPr>
+            <a:fld id="{FBCC3686-6725-4AFD-ADDC-6473F9C2C89C}" type="slidenum">
+              <a:rPr lang="fr-FR" smtClean="0"/>
+              <a:pPr>
+                <a:defRPr/>
+              </a:pPr>
+              <a:t>23</a:t>
+            </a:fld>
+            <a:endParaRPr lang="fr-FR" dirty="0"/>
+          </a:p>
+        </p:txBody>
+      </p:sp>
+    </p:spTree>
+    <p:extLst>
+      <p:ext uri="{BB962C8B-B14F-4D97-AF65-F5344CB8AC3E}">
+        <p14:creationId xmlns:p14="http://schemas.microsoft.com/office/powerpoint/2010/main" val="3754545163"/>
+      </p:ext>
+    </p:extLst>
+  </p:cSld>
+  <p:clrMapOvr>
+    <a:masterClrMapping/>
+  </p:clrMapOvr>
+</p:notes>
+</file>
+
+<file path=ppt/notesSlides/notesSlide24.xml><?xml version="1.0" encoding="utf-8"?>
+<p:notes xmlns:a="http://schemas.openxmlformats.org/drawingml/2006/main" xmlns:r="http://schemas.openxmlformats.org/officeDocument/2006/relationships" xmlns:p="http://schemas.openxmlformats.org/presentationml/2006/main">
+  <p:cSld>
+    <p:spTree>
+      <p:nvGrpSpPr>
+        <p:cNvPr id="1" name="">
+          <a:extLst>
+            <a:ext uri="{FF2B5EF4-FFF2-40B4-BE49-F238E27FC236}">
+              <a16:creationId xmlns:a16="http://schemas.microsoft.com/office/drawing/2014/main" id="{462DA57B-DC1B-3E2E-7A30-A74A4C04D852}"/>
+            </a:ext>
+          </a:extLst>
+        </p:cNvPr>
+        <p:cNvGrpSpPr/>
+        <p:nvPr/>
+      </p:nvGrpSpPr>
+      <p:grpSpPr>
+        <a:xfrm>
+          <a:off x="0" y="0"/>
+          <a:ext cx="0" cy="0"/>
+          <a:chOff x="0" y="0"/>
+          <a:chExt cx="0" cy="0"/>
+        </a:xfrm>
+      </p:grpSpPr>
+      <p:sp>
+        <p:nvSpPr>
+          <p:cNvPr id="2" name="Espace réservé de l'image des diapositives 1">
+            <a:extLst>
+              <a:ext uri="{FF2B5EF4-FFF2-40B4-BE49-F238E27FC236}">
+                <a16:creationId xmlns:a16="http://schemas.microsoft.com/office/drawing/2014/main" id="{5018624E-0913-49AB-14BB-B77A0920FA84}"/>
+              </a:ext>
+            </a:extLst>
+          </p:cNvPr>
+          <p:cNvSpPr>
+            <a:spLocks noGrp="1" noRot="1" noChangeAspect="1"/>
+          </p:cNvSpPr>
+          <p:nvPr>
+            <p:ph type="sldImg"/>
+          </p:nvPr>
+        </p:nvSpPr>
+        <p:spPr/>
+      </p:sp>
+      <p:sp>
+        <p:nvSpPr>
+          <p:cNvPr id="3" name="Espace réservé des notes 2">
+            <a:extLst>
+              <a:ext uri="{FF2B5EF4-FFF2-40B4-BE49-F238E27FC236}">
+                <a16:creationId xmlns:a16="http://schemas.microsoft.com/office/drawing/2014/main" id="{A9286935-FAFC-ECA9-C14A-E715182C0E40}"/>
+              </a:ext>
+            </a:extLst>
+          </p:cNvPr>
+          <p:cNvSpPr>
+            <a:spLocks noGrp="1"/>
+          </p:cNvSpPr>
+          <p:nvPr>
+            <p:ph type="body" idx="1"/>
+          </p:nvPr>
+        </p:nvSpPr>
+        <p:spPr/>
+        <p:txBody>
+          <a:bodyPr/>
+          <a:lstStyle/>
+          <a:p>
+            <a:endParaRPr lang="en-US" dirty="0"/>
+          </a:p>
+        </p:txBody>
+      </p:sp>
+      <p:sp>
+        <p:nvSpPr>
+          <p:cNvPr id="4" name="Espace réservé du numéro de diapositive 3">
+            <a:extLst>
+              <a:ext uri="{FF2B5EF4-FFF2-40B4-BE49-F238E27FC236}">
+                <a16:creationId xmlns:a16="http://schemas.microsoft.com/office/drawing/2014/main" id="{FAD93F97-B9D3-6A86-A409-D95FBC27D12C}"/>
+              </a:ext>
+            </a:extLst>
+          </p:cNvPr>
+          <p:cNvSpPr>
+            <a:spLocks noGrp="1"/>
+          </p:cNvSpPr>
+          <p:nvPr>
+            <p:ph type="sldNum" sz="quarter" idx="10"/>
+          </p:nvPr>
+        </p:nvSpPr>
+        <p:spPr/>
+        <p:txBody>
+          <a:bodyPr/>
+          <a:lstStyle/>
+          <a:p>
+            <a:pPr>
+              <a:defRPr/>
+            </a:pPr>
+            <a:fld id="{FBCC3686-6725-4AFD-ADDC-6473F9C2C89C}" type="slidenum">
+              <a:rPr lang="fr-FR" smtClean="0"/>
+              <a:pPr>
+                <a:defRPr/>
+              </a:pPr>
+              <a:t>24</a:t>
+            </a:fld>
+            <a:endParaRPr lang="fr-FR" dirty="0"/>
+          </a:p>
+        </p:txBody>
+      </p:sp>
+    </p:spTree>
+    <p:extLst>
+      <p:ext uri="{BB962C8B-B14F-4D97-AF65-F5344CB8AC3E}">
+        <p14:creationId xmlns:p14="http://schemas.microsoft.com/office/powerpoint/2010/main" val="581602400"/>
+      </p:ext>
+    </p:extLst>
+  </p:cSld>
+  <p:clrMapOvr>
+    <a:masterClrMapping/>
+  </p:clrMapOvr>
+</p:notes>
+</file>
+
+<file path=ppt/notesSlides/notesSlide25.xml><?xml version="1.0" encoding="utf-8"?>
+<p:notes xmlns:a="http://schemas.openxmlformats.org/drawingml/2006/main" xmlns:r="http://schemas.openxmlformats.org/officeDocument/2006/relationships" xmlns:p="http://schemas.openxmlformats.org/presentationml/2006/main">
+  <p:cSld>
+    <p:spTree>
+      <p:nvGrpSpPr>
+        <p:cNvPr id="1" name="">
+          <a:extLst>
+            <a:ext uri="{FF2B5EF4-FFF2-40B4-BE49-F238E27FC236}">
+              <a16:creationId xmlns:a16="http://schemas.microsoft.com/office/drawing/2014/main" id="{B46D0FC4-8E6E-276F-5031-F79F61B5D8E7}"/>
+            </a:ext>
+          </a:extLst>
+        </p:cNvPr>
+        <p:cNvGrpSpPr/>
+        <p:nvPr/>
+      </p:nvGrpSpPr>
+      <p:grpSpPr>
+        <a:xfrm>
+          <a:off x="0" y="0"/>
+          <a:ext cx="0" cy="0"/>
+          <a:chOff x="0" y="0"/>
+          <a:chExt cx="0" cy="0"/>
+        </a:xfrm>
+      </p:grpSpPr>
+      <p:sp>
+        <p:nvSpPr>
+          <p:cNvPr id="2" name="Espace réservé de l'image des diapositives 1">
+            <a:extLst>
+              <a:ext uri="{FF2B5EF4-FFF2-40B4-BE49-F238E27FC236}">
+                <a16:creationId xmlns:a16="http://schemas.microsoft.com/office/drawing/2014/main" id="{70D5CB58-A763-996A-C417-05BA9140FB07}"/>
+              </a:ext>
+            </a:extLst>
+          </p:cNvPr>
+          <p:cNvSpPr>
+            <a:spLocks noGrp="1" noRot="1" noChangeAspect="1"/>
+          </p:cNvSpPr>
+          <p:nvPr>
+            <p:ph type="sldImg"/>
+          </p:nvPr>
+        </p:nvSpPr>
+        <p:spPr/>
+      </p:sp>
+      <p:sp>
+        <p:nvSpPr>
+          <p:cNvPr id="3" name="Espace réservé des notes 2">
+            <a:extLst>
+              <a:ext uri="{FF2B5EF4-FFF2-40B4-BE49-F238E27FC236}">
+                <a16:creationId xmlns:a16="http://schemas.microsoft.com/office/drawing/2014/main" id="{03265198-0A0E-E70C-5293-73A40F399B97}"/>
+              </a:ext>
+            </a:extLst>
+          </p:cNvPr>
+          <p:cNvSpPr>
+            <a:spLocks noGrp="1"/>
+          </p:cNvSpPr>
+          <p:nvPr>
+            <p:ph type="body" idx="1"/>
+          </p:nvPr>
+        </p:nvSpPr>
+        <p:spPr/>
+        <p:txBody>
+          <a:bodyPr/>
+          <a:lstStyle/>
+          <a:p>
+            <a:endParaRPr lang="en-US" dirty="0"/>
+          </a:p>
+        </p:txBody>
+      </p:sp>
+      <p:sp>
+        <p:nvSpPr>
+          <p:cNvPr id="4" name="Espace réservé du numéro de diapositive 3">
+            <a:extLst>
+              <a:ext uri="{FF2B5EF4-FFF2-40B4-BE49-F238E27FC236}">
+                <a16:creationId xmlns:a16="http://schemas.microsoft.com/office/drawing/2014/main" id="{573BBFAF-E200-D0BF-6755-09B3F0C288C7}"/>
+              </a:ext>
+            </a:extLst>
+          </p:cNvPr>
+          <p:cNvSpPr>
+            <a:spLocks noGrp="1"/>
+          </p:cNvSpPr>
+          <p:nvPr>
+            <p:ph type="sldNum" sz="quarter" idx="10"/>
+          </p:nvPr>
+        </p:nvSpPr>
+        <p:spPr/>
+        <p:txBody>
+          <a:bodyPr/>
+          <a:lstStyle/>
+          <a:p>
+            <a:pPr>
+              <a:defRPr/>
+            </a:pPr>
+            <a:fld id="{FBCC3686-6725-4AFD-ADDC-6473F9C2C89C}" type="slidenum">
+              <a:rPr lang="fr-FR" smtClean="0"/>
+              <a:pPr>
+                <a:defRPr/>
+              </a:pPr>
+              <a:t>25</a:t>
+            </a:fld>
+            <a:endParaRPr lang="fr-FR" dirty="0"/>
+          </a:p>
+        </p:txBody>
+      </p:sp>
+    </p:spTree>
+    <p:extLst>
+      <p:ext uri="{BB962C8B-B14F-4D97-AF65-F5344CB8AC3E}">
+        <p14:creationId xmlns:p14="http://schemas.microsoft.com/office/powerpoint/2010/main" val="2236909692"/>
+      </p:ext>
+    </p:extLst>
+  </p:cSld>
+  <p:clrMapOvr>
+    <a:masterClrMapping/>
+  </p:clrMapOvr>
+</p:notes>
+</file>
+
+<file path=ppt/notesSlides/notesSlide26.xml><?xml version="1.0" encoding="utf-8"?>
+<p:notes xmlns:a="http://schemas.openxmlformats.org/drawingml/2006/main" xmlns:r="http://schemas.openxmlformats.org/officeDocument/2006/relationships" xmlns:p="http://schemas.openxmlformats.org/presentationml/2006/main">
+  <p:cSld>
+    <p:spTree>
+      <p:nvGrpSpPr>
+        <p:cNvPr id="1" name="">
+          <a:extLst>
+            <a:ext uri="{FF2B5EF4-FFF2-40B4-BE49-F238E27FC236}">
+              <a16:creationId xmlns:a16="http://schemas.microsoft.com/office/drawing/2014/main" id="{21957218-9650-623C-3F76-E30FF9FDD990}"/>
+            </a:ext>
+          </a:extLst>
+        </p:cNvPr>
+        <p:cNvGrpSpPr/>
+        <p:nvPr/>
+      </p:nvGrpSpPr>
+      <p:grpSpPr>
+        <a:xfrm>
+          <a:off x="0" y="0"/>
+          <a:ext cx="0" cy="0"/>
+          <a:chOff x="0" y="0"/>
+          <a:chExt cx="0" cy="0"/>
+        </a:xfrm>
+      </p:grpSpPr>
+      <p:sp>
+        <p:nvSpPr>
+          <p:cNvPr id="2" name="Espace réservé de l'image des diapositives 1">
+            <a:extLst>
+              <a:ext uri="{FF2B5EF4-FFF2-40B4-BE49-F238E27FC236}">
+                <a16:creationId xmlns:a16="http://schemas.microsoft.com/office/drawing/2014/main" id="{32A986BD-7E8D-51D8-EB85-942A22C57397}"/>
+              </a:ext>
+            </a:extLst>
+          </p:cNvPr>
+          <p:cNvSpPr>
+            <a:spLocks noGrp="1" noRot="1" noChangeAspect="1"/>
+          </p:cNvSpPr>
+          <p:nvPr>
+            <p:ph type="sldImg"/>
+          </p:nvPr>
+        </p:nvSpPr>
+        <p:spPr/>
+      </p:sp>
+      <p:sp>
+        <p:nvSpPr>
+          <p:cNvPr id="3" name="Espace réservé des notes 2">
+            <a:extLst>
+              <a:ext uri="{FF2B5EF4-FFF2-40B4-BE49-F238E27FC236}">
+                <a16:creationId xmlns:a16="http://schemas.microsoft.com/office/drawing/2014/main" id="{D143A74A-5041-9A71-10E2-58B810049729}"/>
+              </a:ext>
+            </a:extLst>
+          </p:cNvPr>
+          <p:cNvSpPr>
+            <a:spLocks noGrp="1"/>
+          </p:cNvSpPr>
+          <p:nvPr>
+            <p:ph type="body" idx="1"/>
+          </p:nvPr>
+        </p:nvSpPr>
+        <p:spPr/>
+        <p:txBody>
+          <a:bodyPr/>
+          <a:lstStyle/>
+          <a:p>
+            <a:endParaRPr lang="en-US" dirty="0"/>
+          </a:p>
+        </p:txBody>
+      </p:sp>
+      <p:sp>
+        <p:nvSpPr>
+          <p:cNvPr id="4" name="Espace réservé du numéro de diapositive 3">
+            <a:extLst>
+              <a:ext uri="{FF2B5EF4-FFF2-40B4-BE49-F238E27FC236}">
+                <a16:creationId xmlns:a16="http://schemas.microsoft.com/office/drawing/2014/main" id="{DF6292B4-01D5-AE28-4390-E9A2978B497C}"/>
+              </a:ext>
+            </a:extLst>
+          </p:cNvPr>
+          <p:cNvSpPr>
+            <a:spLocks noGrp="1"/>
+          </p:cNvSpPr>
+          <p:nvPr>
+            <p:ph type="sldNum" sz="quarter" idx="10"/>
+          </p:nvPr>
+        </p:nvSpPr>
+        <p:spPr/>
+        <p:txBody>
+          <a:bodyPr/>
+          <a:lstStyle/>
+          <a:p>
+            <a:pPr>
+              <a:defRPr/>
+            </a:pPr>
+            <a:fld id="{FBCC3686-6725-4AFD-ADDC-6473F9C2C89C}" type="slidenum">
+              <a:rPr lang="fr-FR" smtClean="0"/>
+              <a:pPr>
+                <a:defRPr/>
+              </a:pPr>
+              <a:t>26</a:t>
+            </a:fld>
+            <a:endParaRPr lang="fr-FR" dirty="0"/>
+          </a:p>
+        </p:txBody>
+      </p:sp>
+    </p:spTree>
+    <p:extLst>
+      <p:ext uri="{BB962C8B-B14F-4D97-AF65-F5344CB8AC3E}">
+        <p14:creationId xmlns:p14="http://schemas.microsoft.com/office/powerpoint/2010/main" val="1422168340"/>
       </p:ext>
     </p:extLst>
   </p:cSld>
@@ -8890,7 +9350,7 @@
                   <a:schemeClr val="tx1"/>
                 </a:solidFill>
               </a:rPr>
-              <a:t>Pas plus de 5 variables d'instances (attributs ou propriétés)</a:t>
+              <a:t>Pas plus de 2 variables d'instances (attributs ou propriétés)</a:t>
             </a:r>
           </a:p>
           <a:p>
@@ -10526,7 +10986,7 @@
           <a:p>
             <a:r>
               <a:rPr lang="fr-FR" dirty="0"/>
-              <a:t>Pas plus de 5 variables d'instances (attributs ou propriétés)</a:t>
+              <a:t>Pas plus de 2 variables d'instances (attributs ou propriétés)</a:t>
             </a:r>
           </a:p>
         </p:txBody>
@@ -10578,7 +11038,7 @@
                   <a:schemeClr val="tx1"/>
                 </a:solidFill>
               </a:rPr>
-              <a:t>Il ne faut pas avoir plus de 5 variables d'instances pour une même classe ; cas signifiant que l'on a sûrement mal découpé et qu'on n'a pas respecté le principe SRP de SOLID...</a:t>
+              <a:t>Il ne faut pas avoir plus de 2 variables d'instances pour une même classe.</a:t>
             </a:r>
           </a:p>
           <a:p>
@@ -10603,9 +11063,8 @@
                   <a:schemeClr val="tx1"/>
                 </a:solidFill>
               </a:rPr>
-              <a:t>Ce point est très proche de la Loi de Demeter avec un seul point par ligne. Il ne peut être pas toujours possible d'interdire les Getter mais il faut toujours limiter voir interdire les Setter afin d'utiliser des méthodes dédiées pour ne pas désencapsuler l'objet.</a:t>
-            </a:r>
-            <a:endParaRPr lang="fr-FR" dirty="0"/>
+              <a:t>Si on dépasse, c’est que l'on a sûrement mal découpé ou qu'on n'a pas respecté le principe SRP de SOLID...</a:t>
+            </a:r>
           </a:p>
         </p:txBody>
       </p:sp>
@@ -10827,6 +11286,972 @@
 </file>
 
 <file path=ppt/slides/slide23.xml><?xml version="1.0" encoding="utf-8"?>
+<p:sld xmlns:a="http://schemas.openxmlformats.org/drawingml/2006/main" xmlns:r="http://schemas.openxmlformats.org/officeDocument/2006/relationships" xmlns:p="http://schemas.openxmlformats.org/presentationml/2006/main">
+  <p:cSld>
+    <p:spTree>
+      <p:nvGrpSpPr>
+        <p:cNvPr id="1" name="">
+          <a:extLst>
+            <a:ext uri="{FF2B5EF4-FFF2-40B4-BE49-F238E27FC236}">
+              <a16:creationId xmlns:a16="http://schemas.microsoft.com/office/drawing/2014/main" id="{8169E064-246A-ADBC-AFE0-9B25867CAD2C}"/>
+            </a:ext>
+          </a:extLst>
+        </p:cNvPr>
+        <p:cNvGrpSpPr/>
+        <p:nvPr/>
+      </p:nvGrpSpPr>
+      <p:grpSpPr>
+        <a:xfrm>
+          <a:off x="0" y="0"/>
+          <a:ext cx="0" cy="0"/>
+          <a:chOff x="0" y="0"/>
+          <a:chExt cx="0" cy="0"/>
+        </a:xfrm>
+      </p:grpSpPr>
+      <p:pic>
+        <p:nvPicPr>
+          <p:cNvPr id="8" name="Picture Placeholder 7">
+            <a:extLst>
+              <a:ext uri="{FF2B5EF4-FFF2-40B4-BE49-F238E27FC236}">
+                <a16:creationId xmlns:a16="http://schemas.microsoft.com/office/drawing/2014/main" id="{FECC68D6-466B-B805-E358-EE344C1E9248}"/>
+              </a:ext>
+            </a:extLst>
+          </p:cNvPr>
+          <p:cNvPicPr>
+            <a:picLocks noGrp="1" noChangeAspect="1"/>
+          </p:cNvPicPr>
+          <p:nvPr>
+            <p:ph type="pic" idx="1"/>
+          </p:nvPr>
+        </p:nvPicPr>
+        <p:blipFill>
+          <a:blip r:embed="rId3">
+            <a:extLst>
+              <a:ext uri="{28A0092B-C50C-407E-A947-70E740481C1C}">
+                <a14:useLocalDpi xmlns:a14="http://schemas.microsoft.com/office/drawing/2010/main" val="0"/>
+              </a:ext>
+            </a:extLst>
+          </a:blip>
+          <a:srcRect/>
+          <a:stretch>
+            <a:fillRect/>
+          </a:stretch>
+        </p:blipFill>
+        <p:spPr>
+          <a:xfrm>
+            <a:off x="0" y="12357"/>
+            <a:ext cx="9144000" cy="6858000"/>
+          </a:xfrm>
+        </p:spPr>
+      </p:pic>
+      <p:sp>
+        <p:nvSpPr>
+          <p:cNvPr id="5" name="Subtitle 4">
+            <a:extLst>
+              <a:ext uri="{FF2B5EF4-FFF2-40B4-BE49-F238E27FC236}">
+                <a16:creationId xmlns:a16="http://schemas.microsoft.com/office/drawing/2014/main" id="{A57DFD86-83B5-F4F1-D3DB-C276E6B889B9}"/>
+              </a:ext>
+            </a:extLst>
+          </p:cNvPr>
+          <p:cNvSpPr>
+            <a:spLocks noGrp="1"/>
+          </p:cNvSpPr>
+          <p:nvPr>
+            <p:ph type="body" sz="half" idx="2"/>
+          </p:nvPr>
+        </p:nvSpPr>
+        <p:spPr>
+          <a:xfrm>
+            <a:off x="3959999" y="5399999"/>
+            <a:ext cx="4571158" cy="1296891"/>
+          </a:xfrm>
+          <a:prstGeom prst="rect">
+            <a:avLst/>
+          </a:prstGeom>
+        </p:spPr>
+        <p:txBody>
+          <a:bodyPr/>
+          <a:lstStyle/>
+          <a:p>
+            <a:endParaRPr lang="en-US" sz="900" dirty="0"/>
+          </a:p>
+        </p:txBody>
+      </p:sp>
+      <p:sp>
+        <p:nvSpPr>
+          <p:cNvPr id="2" name="TextBox 1">
+            <a:extLst>
+              <a:ext uri="{FF2B5EF4-FFF2-40B4-BE49-F238E27FC236}">
+                <a16:creationId xmlns:a16="http://schemas.microsoft.com/office/drawing/2014/main" id="{4565E00C-FC58-9E95-55DE-6BCFFC247405}"/>
+              </a:ext>
+            </a:extLst>
+          </p:cNvPr>
+          <p:cNvSpPr txBox="1"/>
+          <p:nvPr/>
+        </p:nvSpPr>
+        <p:spPr>
+          <a:xfrm>
+            <a:off x="3959999" y="2514599"/>
+            <a:ext cx="4571158" cy="953211"/>
+          </a:xfrm>
+          <a:prstGeom prst="rect">
+            <a:avLst/>
+          </a:prstGeom>
+          <a:noFill/>
+        </p:spPr>
+        <p:txBody>
+          <a:bodyPr wrap="square" lIns="90000" tIns="46800" rIns="90000" bIns="46800" rtlCol="0" anchor="t" anchorCtr="0">
+            <a:spAutoFit/>
+          </a:bodyPr>
+          <a:lstStyle/>
+          <a:p>
+            <a:pPr>
+              <a:lnSpc>
+                <a:spcPct val="90000"/>
+              </a:lnSpc>
+            </a:pPr>
+            <a:r>
+              <a:rPr lang="nl-NL" sz="3100" b="1" dirty="0" err="1"/>
+              <a:t>Composition</a:t>
+            </a:r>
+            <a:r>
+              <a:rPr lang="nl-NL" sz="3100" b="1" dirty="0"/>
+              <a:t> over </a:t>
+            </a:r>
+            <a:r>
+              <a:rPr lang="nl-NL" sz="3100" b="1" dirty="0" err="1"/>
+              <a:t>Inheritance</a:t>
+            </a:r>
+            <a:endParaRPr lang="nl-NL" sz="3100" b="1" dirty="0"/>
+          </a:p>
+        </p:txBody>
+      </p:sp>
+    </p:spTree>
+    <p:extLst>
+      <p:ext uri="{BB962C8B-B14F-4D97-AF65-F5344CB8AC3E}">
+        <p14:creationId xmlns:p14="http://schemas.microsoft.com/office/powerpoint/2010/main" val="4248356311"/>
+      </p:ext>
+    </p:extLst>
+  </p:cSld>
+  <p:clrMapOvr>
+    <a:masterClrMapping/>
+  </p:clrMapOvr>
+</p:sld>
+</file>
+
+<file path=ppt/slides/slide24.xml><?xml version="1.0" encoding="utf-8"?>
+<p:sld xmlns:a="http://schemas.openxmlformats.org/drawingml/2006/main" xmlns:r="http://schemas.openxmlformats.org/officeDocument/2006/relationships" xmlns:p="http://schemas.openxmlformats.org/presentationml/2006/main">
+  <p:cSld>
+    <p:spTree>
+      <p:nvGrpSpPr>
+        <p:cNvPr id="1" name="">
+          <a:extLst>
+            <a:ext uri="{FF2B5EF4-FFF2-40B4-BE49-F238E27FC236}">
+              <a16:creationId xmlns:a16="http://schemas.microsoft.com/office/drawing/2014/main" id="{0113B0E5-8025-D7D1-C1F7-A6197AD8A55A}"/>
+            </a:ext>
+          </a:extLst>
+        </p:cNvPr>
+        <p:cNvGrpSpPr/>
+        <p:nvPr/>
+      </p:nvGrpSpPr>
+      <p:grpSpPr>
+        <a:xfrm>
+          <a:off x="0" y="0"/>
+          <a:ext cx="0" cy="0"/>
+          <a:chOff x="0" y="0"/>
+          <a:chExt cx="0" cy="0"/>
+        </a:xfrm>
+      </p:grpSpPr>
+      <p:sp>
+        <p:nvSpPr>
+          <p:cNvPr id="6" name="Title 5">
+            <a:extLst>
+              <a:ext uri="{FF2B5EF4-FFF2-40B4-BE49-F238E27FC236}">
+                <a16:creationId xmlns:a16="http://schemas.microsoft.com/office/drawing/2014/main" id="{12A7E752-3486-433B-B149-9027166DAA16}"/>
+              </a:ext>
+            </a:extLst>
+          </p:cNvPr>
+          <p:cNvSpPr>
+            <a:spLocks noGrp="1"/>
+          </p:cNvSpPr>
+          <p:nvPr>
+            <p:ph type="title"/>
+          </p:nvPr>
+        </p:nvSpPr>
+        <p:spPr/>
+        <p:txBody>
+          <a:bodyPr/>
+          <a:lstStyle/>
+          <a:p>
+            <a:r>
+              <a:rPr lang="fr-FR" dirty="0"/>
+              <a:t>Composition over </a:t>
+            </a:r>
+            <a:r>
+              <a:rPr lang="fr-FR" dirty="0" err="1"/>
+              <a:t>Inheritance</a:t>
+            </a:r>
+            <a:r>
+              <a:rPr lang="fr-FR" dirty="0"/>
+              <a:t> (sauf entité anémiée)</a:t>
+            </a:r>
+          </a:p>
+        </p:txBody>
+      </p:sp>
+      <p:sp>
+        <p:nvSpPr>
+          <p:cNvPr id="7" name="Rectangle 3">
+            <a:extLst>
+              <a:ext uri="{FF2B5EF4-FFF2-40B4-BE49-F238E27FC236}">
+                <a16:creationId xmlns:a16="http://schemas.microsoft.com/office/drawing/2014/main" id="{721F2F62-9A24-8202-F124-7F409A815C2B}"/>
+              </a:ext>
+            </a:extLst>
+          </p:cNvPr>
+          <p:cNvSpPr>
+            <a:spLocks noGrp="1" noChangeArrowheads="1"/>
+          </p:cNvSpPr>
+          <p:nvPr>
+            <p:ph type="body" sz="half" idx="2"/>
+          </p:nvPr>
+        </p:nvSpPr>
+        <p:spPr>
+          <a:xfrm>
+            <a:off x="285749" y="1082188"/>
+            <a:ext cx="8518282" cy="5457157"/>
+          </a:xfrm>
+        </p:spPr>
+        <p:txBody>
+          <a:bodyPr/>
+          <a:lstStyle/>
+          <a:p>
+            <a:pPr marL="285750" indent="-285750" algn="just">
+              <a:buFont typeface="Arial" panose="020B0604020202020204" pitchFamily="34" charset="0"/>
+              <a:buChar char="•"/>
+            </a:pPr>
+            <a:endParaRPr lang="fr-FR" dirty="0">
+              <a:solidFill>
+                <a:schemeClr val="tx1"/>
+              </a:solidFill>
+            </a:endParaRPr>
+          </a:p>
+          <a:p>
+            <a:pPr marL="285750" indent="-285750" algn="just">
+              <a:buFont typeface="Arial" panose="020B0604020202020204" pitchFamily="34" charset="0"/>
+              <a:buChar char="•"/>
+            </a:pPr>
+            <a:r>
+              <a:rPr lang="en-US" dirty="0">
+                <a:solidFill>
+                  <a:schemeClr val="tx1"/>
+                </a:solidFill>
+              </a:rPr>
+              <a:t>Il </a:t>
+            </a:r>
+            <a:r>
+              <a:rPr lang="en-US" dirty="0" err="1">
+                <a:solidFill>
+                  <a:schemeClr val="tx1"/>
+                </a:solidFill>
+              </a:rPr>
+              <a:t>s’agit</a:t>
+            </a:r>
+            <a:r>
+              <a:rPr lang="en-US" dirty="0">
+                <a:solidFill>
+                  <a:schemeClr val="tx1"/>
+                </a:solidFill>
+              </a:rPr>
+              <a:t> </a:t>
+            </a:r>
+            <a:r>
+              <a:rPr lang="en-US" dirty="0" err="1">
+                <a:solidFill>
+                  <a:schemeClr val="tx1"/>
+                </a:solidFill>
+              </a:rPr>
+              <a:t>ici</a:t>
+            </a:r>
+            <a:r>
+              <a:rPr lang="en-US" dirty="0">
+                <a:solidFill>
+                  <a:schemeClr val="tx1"/>
+                </a:solidFill>
+              </a:rPr>
+              <a:t> </a:t>
+            </a:r>
+            <a:r>
+              <a:rPr lang="en-US" dirty="0" err="1">
+                <a:solidFill>
+                  <a:schemeClr val="tx1"/>
+                </a:solidFill>
+              </a:rPr>
+              <a:t>d’éviter</a:t>
+            </a:r>
+            <a:r>
+              <a:rPr lang="en-US" dirty="0">
+                <a:solidFill>
+                  <a:schemeClr val="tx1"/>
+                </a:solidFill>
+              </a:rPr>
+              <a:t> </a:t>
+            </a:r>
+            <a:r>
+              <a:rPr lang="en-US" dirty="0" err="1">
+                <a:solidFill>
+                  <a:schemeClr val="tx1"/>
+                </a:solidFill>
+              </a:rPr>
+              <a:t>l’héritage</a:t>
+            </a:r>
+            <a:r>
+              <a:rPr lang="en-US" dirty="0">
+                <a:solidFill>
+                  <a:schemeClr val="tx1"/>
+                </a:solidFill>
+              </a:rPr>
+              <a:t> au profit de la composition sans </a:t>
+            </a:r>
+            <a:r>
+              <a:rPr lang="en-US" dirty="0" err="1">
+                <a:solidFill>
+                  <a:schemeClr val="tx1"/>
+                </a:solidFill>
+              </a:rPr>
+              <a:t>perdre</a:t>
+            </a:r>
+            <a:r>
+              <a:rPr lang="en-US" dirty="0">
+                <a:solidFill>
+                  <a:schemeClr val="tx1"/>
+                </a:solidFill>
+              </a:rPr>
+              <a:t> le </a:t>
+            </a:r>
+            <a:r>
+              <a:rPr lang="en-US" dirty="0" err="1">
+                <a:solidFill>
+                  <a:schemeClr val="tx1"/>
+                </a:solidFill>
+              </a:rPr>
+              <a:t>polymorphisme</a:t>
+            </a:r>
+            <a:r>
+              <a:rPr lang="en-US" dirty="0">
+                <a:solidFill>
+                  <a:schemeClr val="tx1"/>
+                </a:solidFill>
+              </a:rPr>
+              <a:t>.</a:t>
+            </a:r>
+            <a:endParaRPr lang="fr-FR" dirty="0">
+              <a:solidFill>
+                <a:schemeClr val="tx1"/>
+              </a:solidFill>
+            </a:endParaRPr>
+          </a:p>
+          <a:p>
+            <a:pPr marL="285750" indent="-285750" algn="just">
+              <a:buFont typeface="Arial" panose="020B0604020202020204" pitchFamily="34" charset="0"/>
+              <a:buChar char="•"/>
+            </a:pPr>
+            <a:endParaRPr lang="fr-FR" dirty="0">
+              <a:solidFill>
+                <a:schemeClr val="tx1"/>
+              </a:solidFill>
+            </a:endParaRPr>
+          </a:p>
+          <a:p>
+            <a:pPr marL="285750" indent="-285750" algn="just">
+              <a:buFont typeface="Arial" panose="020B0604020202020204" pitchFamily="34" charset="0"/>
+              <a:buChar char="•"/>
+            </a:pPr>
+            <a:r>
+              <a:rPr lang="fr-FR" dirty="0">
+                <a:solidFill>
+                  <a:schemeClr val="tx1"/>
+                </a:solidFill>
+              </a:rPr>
+              <a:t>Ce point doit être pondéré aux comportements d’un objet et non à la définition des caractéristiques d’un objet : comportements VS caractéristiques.</a:t>
+            </a:r>
+          </a:p>
+          <a:p>
+            <a:pPr marL="285750" indent="-285750" algn="just">
+              <a:buFont typeface="Arial" panose="020B0604020202020204" pitchFamily="34" charset="0"/>
+              <a:buChar char="•"/>
+            </a:pPr>
+            <a:endParaRPr lang="fr-FR" dirty="0">
+              <a:solidFill>
+                <a:schemeClr val="tx1"/>
+              </a:solidFill>
+            </a:endParaRPr>
+          </a:p>
+          <a:p>
+            <a:pPr marL="285750" indent="-285750" algn="just">
+              <a:buFont typeface="Arial" panose="020B0604020202020204" pitchFamily="34" charset="0"/>
+              <a:buChar char="•"/>
+            </a:pPr>
+            <a:r>
+              <a:rPr lang="fr-FR" dirty="0">
+                <a:solidFill>
+                  <a:schemeClr val="tx1"/>
+                </a:solidFill>
+              </a:rPr>
+              <a:t>En effet, le côté systématique de ce pattern est plus difficilement applicable à des caractéristiques ou du stockage de données via des entités dites anémiées (uniquement getter/setter) comme les </a:t>
+            </a:r>
+            <a:r>
+              <a:rPr lang="fr-FR" dirty="0" err="1">
+                <a:solidFill>
+                  <a:schemeClr val="tx1"/>
+                </a:solidFill>
+              </a:rPr>
+              <a:t>DTOs</a:t>
+            </a:r>
+            <a:r>
+              <a:rPr lang="fr-FR" dirty="0">
+                <a:solidFill>
+                  <a:schemeClr val="tx1"/>
+                </a:solidFill>
+              </a:rPr>
+              <a:t>, </a:t>
+            </a:r>
+            <a:r>
+              <a:rPr lang="fr-FR" dirty="0" err="1">
+                <a:solidFill>
+                  <a:schemeClr val="tx1"/>
+                </a:solidFill>
+              </a:rPr>
+              <a:t>ViewObjects</a:t>
+            </a:r>
+            <a:r>
+              <a:rPr lang="fr-FR" dirty="0">
+                <a:solidFill>
+                  <a:schemeClr val="tx1"/>
+                </a:solidFill>
+              </a:rPr>
+              <a:t>, Data </a:t>
+            </a:r>
+            <a:r>
+              <a:rPr lang="fr-FR" dirty="0" err="1">
+                <a:solidFill>
+                  <a:schemeClr val="tx1"/>
+                </a:solidFill>
+              </a:rPr>
+              <a:t>Entities</a:t>
+            </a:r>
+            <a:r>
+              <a:rPr lang="fr-FR" dirty="0">
+                <a:solidFill>
+                  <a:schemeClr val="tx1"/>
+                </a:solidFill>
+              </a:rPr>
+              <a:t>…</a:t>
+            </a:r>
+          </a:p>
+          <a:p>
+            <a:pPr lvl="1" indent="0" algn="just">
+              <a:buNone/>
+            </a:pPr>
+            <a:endParaRPr lang="fr-FR" dirty="0">
+              <a:solidFill>
+                <a:schemeClr val="tx1"/>
+              </a:solidFill>
+            </a:endParaRPr>
+          </a:p>
+          <a:p>
+            <a:pPr marL="285750" indent="-285750" algn="just">
+              <a:buFont typeface="Arial" panose="020B0604020202020204" pitchFamily="34" charset="0"/>
+              <a:buChar char="•"/>
+            </a:pPr>
+            <a:endParaRPr lang="fr-FR" dirty="0"/>
+          </a:p>
+        </p:txBody>
+      </p:sp>
+    </p:spTree>
+    <p:extLst>
+      <p:ext uri="{BB962C8B-B14F-4D97-AF65-F5344CB8AC3E}">
+        <p14:creationId xmlns:p14="http://schemas.microsoft.com/office/powerpoint/2010/main" val="4075386417"/>
+      </p:ext>
+    </p:extLst>
+  </p:cSld>
+  <p:clrMapOvr>
+    <a:masterClrMapping/>
+  </p:clrMapOvr>
+</p:sld>
+</file>
+
+<file path=ppt/slides/slide25.xml><?xml version="1.0" encoding="utf-8"?>
+<p:sld xmlns:a="http://schemas.openxmlformats.org/drawingml/2006/main" xmlns:r="http://schemas.openxmlformats.org/officeDocument/2006/relationships" xmlns:p="http://schemas.openxmlformats.org/presentationml/2006/main">
+  <p:cSld>
+    <p:spTree>
+      <p:nvGrpSpPr>
+        <p:cNvPr id="1" name="">
+          <a:extLst>
+            <a:ext uri="{FF2B5EF4-FFF2-40B4-BE49-F238E27FC236}">
+              <a16:creationId xmlns:a16="http://schemas.microsoft.com/office/drawing/2014/main" id="{0563E553-887E-6B88-766E-7883B53AE5B8}"/>
+            </a:ext>
+          </a:extLst>
+        </p:cNvPr>
+        <p:cNvGrpSpPr/>
+        <p:nvPr/>
+      </p:nvGrpSpPr>
+      <p:grpSpPr>
+        <a:xfrm>
+          <a:off x="0" y="0"/>
+          <a:ext cx="0" cy="0"/>
+          <a:chOff x="0" y="0"/>
+          <a:chExt cx="0" cy="0"/>
+        </a:xfrm>
+      </p:grpSpPr>
+      <p:sp>
+        <p:nvSpPr>
+          <p:cNvPr id="6" name="Title 5">
+            <a:extLst>
+              <a:ext uri="{FF2B5EF4-FFF2-40B4-BE49-F238E27FC236}">
+                <a16:creationId xmlns:a16="http://schemas.microsoft.com/office/drawing/2014/main" id="{83A7CD0C-E789-DA85-61D3-561121D5283F}"/>
+              </a:ext>
+            </a:extLst>
+          </p:cNvPr>
+          <p:cNvSpPr>
+            <a:spLocks noGrp="1"/>
+          </p:cNvSpPr>
+          <p:nvPr>
+            <p:ph type="title"/>
+          </p:nvPr>
+        </p:nvSpPr>
+        <p:spPr/>
+        <p:txBody>
+          <a:bodyPr/>
+          <a:lstStyle/>
+          <a:p>
+            <a:r>
+              <a:rPr lang="fr-FR" dirty="0"/>
+              <a:t>Composition over </a:t>
+            </a:r>
+            <a:r>
+              <a:rPr lang="fr-FR" dirty="0" err="1"/>
+              <a:t>Inheritance</a:t>
+            </a:r>
+            <a:r>
+              <a:rPr lang="fr-FR" dirty="0"/>
+              <a:t> (sauf entité anémiée)</a:t>
+            </a:r>
+          </a:p>
+        </p:txBody>
+      </p:sp>
+      <p:sp>
+        <p:nvSpPr>
+          <p:cNvPr id="7" name="Rectangle 3">
+            <a:extLst>
+              <a:ext uri="{FF2B5EF4-FFF2-40B4-BE49-F238E27FC236}">
+                <a16:creationId xmlns:a16="http://schemas.microsoft.com/office/drawing/2014/main" id="{9C677D94-1403-43B3-427C-E5ABA5DAC80D}"/>
+              </a:ext>
+            </a:extLst>
+          </p:cNvPr>
+          <p:cNvSpPr>
+            <a:spLocks noGrp="1" noChangeArrowheads="1"/>
+          </p:cNvSpPr>
+          <p:nvPr>
+            <p:ph type="body" sz="half" idx="2"/>
+          </p:nvPr>
+        </p:nvSpPr>
+        <p:spPr>
+          <a:xfrm>
+            <a:off x="285749" y="1082188"/>
+            <a:ext cx="8518282" cy="5457157"/>
+          </a:xfrm>
+        </p:spPr>
+        <p:txBody>
+          <a:bodyPr/>
+          <a:lstStyle/>
+          <a:p>
+            <a:pPr marL="285750" indent="-285750" algn="just">
+              <a:buFont typeface="Arial" panose="020B0604020202020204" pitchFamily="34" charset="0"/>
+              <a:buChar char="•"/>
+            </a:pPr>
+            <a:endParaRPr lang="fr-FR" dirty="0">
+              <a:solidFill>
+                <a:schemeClr val="tx1"/>
+              </a:solidFill>
+            </a:endParaRPr>
+          </a:p>
+          <a:p>
+            <a:pPr marL="285750" indent="-285750" algn="just">
+              <a:buFont typeface="Arial" panose="020B0604020202020204" pitchFamily="34" charset="0"/>
+              <a:buChar char="•"/>
+            </a:pPr>
+            <a:r>
+              <a:rPr lang="fr-FR" dirty="0">
+                <a:solidFill>
+                  <a:schemeClr val="tx1"/>
+                </a:solidFill>
+              </a:rPr>
+              <a:t>Les éléments principaux et constitutifs de ce pattern :</a:t>
+            </a:r>
+          </a:p>
+          <a:p>
+            <a:pPr marL="914400" lvl="1" indent="-285750" algn="just"/>
+            <a:endParaRPr lang="fr-FR" dirty="0"/>
+          </a:p>
+          <a:p>
+            <a:pPr marL="914400" lvl="1" indent="-285750" algn="just"/>
+            <a:r>
+              <a:rPr lang="fr-FR" dirty="0"/>
+              <a:t>Usage d’interfaces pour décrire le comportement à composer.</a:t>
+            </a:r>
+          </a:p>
+          <a:p>
+            <a:pPr marL="914400" lvl="1" indent="-285750" algn="just"/>
+            <a:endParaRPr lang="fr-FR" dirty="0"/>
+          </a:p>
+          <a:p>
+            <a:pPr marL="914400" lvl="1" indent="-285750" algn="just"/>
+            <a:r>
+              <a:rPr lang="fr-FR" dirty="0"/>
+              <a:t>Autant de types d’implémentations que de comportements différents.</a:t>
+            </a:r>
+          </a:p>
+          <a:p>
+            <a:pPr marL="914400" lvl="1" indent="-285750" algn="just"/>
+            <a:endParaRPr lang="fr-FR" dirty="0">
+              <a:solidFill>
+                <a:schemeClr val="tx1"/>
+              </a:solidFill>
+            </a:endParaRPr>
+          </a:p>
+          <a:p>
+            <a:pPr marL="914400" lvl="1" indent="-285750" algn="just"/>
+            <a:r>
+              <a:rPr lang="fr-FR" dirty="0">
+                <a:solidFill>
+                  <a:schemeClr val="tx1"/>
+                </a:solidFill>
+              </a:rPr>
+              <a:t>Usage d’</a:t>
+            </a:r>
+            <a:r>
+              <a:rPr lang="fr-FR" dirty="0" err="1">
+                <a:solidFill>
+                  <a:schemeClr val="tx1"/>
+                </a:solidFill>
+              </a:rPr>
+              <a:t>IoC</a:t>
+            </a:r>
+            <a:r>
+              <a:rPr lang="fr-FR" dirty="0">
+                <a:solidFill>
+                  <a:schemeClr val="tx1"/>
+                </a:solidFill>
+              </a:rPr>
+              <a:t>/DI (voi</a:t>
+            </a:r>
+            <a:r>
+              <a:rPr lang="fr-FR" dirty="0"/>
+              <a:t>r D de SOLID) pour injecter ces comportements.</a:t>
+            </a:r>
+          </a:p>
+          <a:p>
+            <a:pPr marL="914400" lvl="1" indent="-285750" algn="just"/>
+            <a:endParaRPr lang="fr-FR" dirty="0">
+              <a:solidFill>
+                <a:schemeClr val="tx1"/>
+              </a:solidFill>
+            </a:endParaRPr>
+          </a:p>
+          <a:p>
+            <a:pPr marL="914400" lvl="1" indent="-285750" algn="just"/>
+            <a:r>
+              <a:rPr lang="fr-FR">
+                <a:solidFill>
+                  <a:schemeClr val="tx1"/>
+                </a:solidFill>
+              </a:rPr>
+              <a:t>Respect </a:t>
+            </a:r>
+            <a:r>
+              <a:rPr lang="fr-FR" dirty="0">
+                <a:solidFill>
+                  <a:schemeClr val="tx1"/>
+                </a:solidFill>
+              </a:rPr>
+              <a:t>des principes de DRY (Don’t </a:t>
+            </a:r>
+            <a:r>
+              <a:rPr lang="fr-FR" dirty="0" err="1">
+                <a:solidFill>
+                  <a:schemeClr val="tx1"/>
+                </a:solidFill>
+              </a:rPr>
+              <a:t>Repeat</a:t>
+            </a:r>
+            <a:r>
+              <a:rPr lang="fr-FR" dirty="0">
+                <a:solidFill>
+                  <a:schemeClr val="tx1"/>
+                </a:solidFill>
+              </a:rPr>
+              <a:t> </a:t>
+            </a:r>
+            <a:r>
+              <a:rPr lang="fr-FR" dirty="0" err="1">
+                <a:solidFill>
+                  <a:schemeClr val="tx1"/>
+                </a:solidFill>
+              </a:rPr>
+              <a:t>Yourself</a:t>
+            </a:r>
+            <a:r>
+              <a:rPr lang="fr-FR" dirty="0">
+                <a:solidFill>
+                  <a:schemeClr val="tx1"/>
+                </a:solidFill>
+              </a:rPr>
+              <a:t>) sera assuré par l’injection de la même implémentation.</a:t>
+            </a:r>
+          </a:p>
+          <a:p>
+            <a:pPr marL="914400" lvl="1" indent="-285750" algn="just"/>
+            <a:endParaRPr lang="fr-FR" dirty="0"/>
+          </a:p>
+          <a:p>
+            <a:pPr marL="914400" lvl="1" indent="-285750" algn="just"/>
+            <a:endParaRPr lang="fr-FR" dirty="0">
+              <a:solidFill>
+                <a:schemeClr val="tx1"/>
+              </a:solidFill>
+            </a:endParaRPr>
+          </a:p>
+          <a:p>
+            <a:pPr lvl="1" indent="0" algn="just">
+              <a:buNone/>
+            </a:pPr>
+            <a:endParaRPr lang="fr-FR" dirty="0">
+              <a:solidFill>
+                <a:schemeClr val="tx1"/>
+              </a:solidFill>
+            </a:endParaRPr>
+          </a:p>
+          <a:p>
+            <a:pPr marL="285750" indent="-285750" algn="just">
+              <a:buFont typeface="Arial" panose="020B0604020202020204" pitchFamily="34" charset="0"/>
+              <a:buChar char="•"/>
+            </a:pPr>
+            <a:endParaRPr lang="fr-FR" dirty="0"/>
+          </a:p>
+        </p:txBody>
+      </p:sp>
+    </p:spTree>
+    <p:extLst>
+      <p:ext uri="{BB962C8B-B14F-4D97-AF65-F5344CB8AC3E}">
+        <p14:creationId xmlns:p14="http://schemas.microsoft.com/office/powerpoint/2010/main" val="2629538674"/>
+      </p:ext>
+    </p:extLst>
+  </p:cSld>
+  <p:clrMapOvr>
+    <a:masterClrMapping/>
+  </p:clrMapOvr>
+</p:sld>
+</file>
+
+<file path=ppt/slides/slide26.xml><?xml version="1.0" encoding="utf-8"?>
+<p:sld xmlns:a="http://schemas.openxmlformats.org/drawingml/2006/main" xmlns:r="http://schemas.openxmlformats.org/officeDocument/2006/relationships" xmlns:p="http://schemas.openxmlformats.org/presentationml/2006/main">
+  <p:cSld>
+    <p:spTree>
+      <p:nvGrpSpPr>
+        <p:cNvPr id="1" name="">
+          <a:extLst>
+            <a:ext uri="{FF2B5EF4-FFF2-40B4-BE49-F238E27FC236}">
+              <a16:creationId xmlns:a16="http://schemas.microsoft.com/office/drawing/2014/main" id="{6C47CB6A-9E21-9D44-33AC-B6B0838329EB}"/>
+            </a:ext>
+          </a:extLst>
+        </p:cNvPr>
+        <p:cNvGrpSpPr/>
+        <p:nvPr/>
+      </p:nvGrpSpPr>
+      <p:grpSpPr>
+        <a:xfrm>
+          <a:off x="0" y="0"/>
+          <a:ext cx="0" cy="0"/>
+          <a:chOff x="0" y="0"/>
+          <a:chExt cx="0" cy="0"/>
+        </a:xfrm>
+      </p:grpSpPr>
+      <p:sp>
+        <p:nvSpPr>
+          <p:cNvPr id="6" name="Title 5">
+            <a:extLst>
+              <a:ext uri="{FF2B5EF4-FFF2-40B4-BE49-F238E27FC236}">
+                <a16:creationId xmlns:a16="http://schemas.microsoft.com/office/drawing/2014/main" id="{0D876885-1D33-C1BA-F908-1446526633F4}"/>
+              </a:ext>
+            </a:extLst>
+          </p:cNvPr>
+          <p:cNvSpPr>
+            <a:spLocks noGrp="1"/>
+          </p:cNvSpPr>
+          <p:nvPr>
+            <p:ph type="title"/>
+          </p:nvPr>
+        </p:nvSpPr>
+        <p:spPr/>
+        <p:txBody>
+          <a:bodyPr/>
+          <a:lstStyle/>
+          <a:p>
+            <a:r>
+              <a:rPr lang="fr-FR" dirty="0"/>
+              <a:t>Composition over </a:t>
+            </a:r>
+            <a:r>
+              <a:rPr lang="fr-FR" dirty="0" err="1"/>
+              <a:t>Inheritance</a:t>
+            </a:r>
+            <a:r>
+              <a:rPr lang="fr-FR" dirty="0"/>
+              <a:t> (sauf entité anémiée)</a:t>
+            </a:r>
+          </a:p>
+        </p:txBody>
+      </p:sp>
+      <p:sp>
+        <p:nvSpPr>
+          <p:cNvPr id="7" name="Rectangle 3">
+            <a:extLst>
+              <a:ext uri="{FF2B5EF4-FFF2-40B4-BE49-F238E27FC236}">
+                <a16:creationId xmlns:a16="http://schemas.microsoft.com/office/drawing/2014/main" id="{0A7A4165-143D-5883-98F2-77E05BCA9816}"/>
+              </a:ext>
+            </a:extLst>
+          </p:cNvPr>
+          <p:cNvSpPr>
+            <a:spLocks noGrp="1" noChangeArrowheads="1"/>
+          </p:cNvSpPr>
+          <p:nvPr>
+            <p:ph type="body" sz="half" idx="2"/>
+          </p:nvPr>
+        </p:nvSpPr>
+        <p:spPr>
+          <a:xfrm>
+            <a:off x="285749" y="1082188"/>
+            <a:ext cx="8518282" cy="5457157"/>
+          </a:xfrm>
+        </p:spPr>
+        <p:txBody>
+          <a:bodyPr/>
+          <a:lstStyle/>
+          <a:p>
+            <a:pPr marL="285750" indent="-285750" algn="just">
+              <a:buFont typeface="Arial" panose="020B0604020202020204" pitchFamily="34" charset="0"/>
+              <a:buChar char="•"/>
+            </a:pPr>
+            <a:endParaRPr lang="fr-FR" dirty="0">
+              <a:solidFill>
+                <a:schemeClr val="tx1"/>
+              </a:solidFill>
+            </a:endParaRPr>
+          </a:p>
+          <a:p>
+            <a:pPr marL="914400" lvl="1" indent="-285750" algn="just"/>
+            <a:endParaRPr lang="fr-FR" dirty="0"/>
+          </a:p>
+          <a:p>
+            <a:pPr marL="285750" indent="-285750" algn="just">
+              <a:buFont typeface="Arial" panose="020B0604020202020204" pitchFamily="34" charset="0"/>
+              <a:buChar char="•"/>
+            </a:pPr>
+            <a:r>
+              <a:rPr lang="fr-FR" dirty="0">
+                <a:solidFill>
+                  <a:schemeClr val="tx1"/>
+                </a:solidFill>
+              </a:rPr>
+              <a:t>Pourquoi utiliser ce pattern et pourquoi considérer que l’héritage tend à devenir un anti-pattern ?</a:t>
+            </a:r>
+          </a:p>
+          <a:p>
+            <a:pPr marL="914400" lvl="1" indent="-285750" algn="just"/>
+            <a:r>
+              <a:rPr lang="fr-FR" dirty="0"/>
+              <a:t>En conception initiale via l’héritage, on va essayer de recouvrir tous les cas d’évolution possible pour respecter le O de SOLID mais on va sûrement tendre à de l’over engineering avec très souvent un non respect des principes YAGNI (« </a:t>
+            </a:r>
+            <a:r>
+              <a:rPr lang="en-US" dirty="0"/>
+              <a:t>You aren't </a:t>
+            </a:r>
+            <a:r>
+              <a:rPr lang="en-US" dirty="0" err="1"/>
+              <a:t>gonna</a:t>
+            </a:r>
+            <a:r>
+              <a:rPr lang="en-US" dirty="0"/>
+              <a:t> need it </a:t>
+            </a:r>
+            <a:r>
+              <a:rPr lang="fr-FR" dirty="0"/>
+              <a:t>» ou on fait ce qu’on nous demande et pas plus) ou KISS (« </a:t>
+            </a:r>
+            <a:r>
+              <a:rPr lang="fr-FR" dirty="0" err="1"/>
+              <a:t>Keep</a:t>
+            </a:r>
+            <a:r>
+              <a:rPr lang="fr-FR" dirty="0"/>
+              <a:t> It Simple </a:t>
+            </a:r>
+            <a:r>
+              <a:rPr lang="fr-FR" dirty="0" err="1"/>
+              <a:t>Stupid</a:t>
+            </a:r>
+            <a:r>
+              <a:rPr lang="fr-FR" dirty="0"/>
+              <a:t>! »). C’est d’ailleurs ce qu’on voit sur les dictionnaires, on a essayé un truc évolutif avec plein de gars futurs inutiles au départ, mais au final, on a une usine à gaz et rare sont les fois où j’ai pu voir un héritage bien anticipé (si ce n’est jamais).</a:t>
+            </a:r>
+          </a:p>
+          <a:p>
+            <a:pPr marL="914400" lvl="1" indent="-285750" algn="just"/>
+            <a:r>
+              <a:rPr lang="fr-FR" dirty="0"/>
+              <a:t>•	Soit on va essayer de coller au besoin mais à moyen terme voire court terme, on va être obliger de casser le C… Car les besoins vont évoluer.</a:t>
+            </a:r>
+          </a:p>
+          <a:p>
+            <a:pPr marL="914400" lvl="1" indent="-285750" algn="just"/>
+            <a:endParaRPr lang="fr-FR" dirty="0">
+              <a:solidFill>
+                <a:schemeClr val="tx1"/>
+              </a:solidFill>
+            </a:endParaRPr>
+          </a:p>
+          <a:p>
+            <a:pPr lvl="1" indent="0" algn="just">
+              <a:buNone/>
+            </a:pPr>
+            <a:endParaRPr lang="fr-FR" dirty="0">
+              <a:solidFill>
+                <a:schemeClr val="tx1"/>
+              </a:solidFill>
+            </a:endParaRPr>
+          </a:p>
+          <a:p>
+            <a:pPr marL="285750" indent="-285750" algn="just">
+              <a:buFont typeface="Arial" panose="020B0604020202020204" pitchFamily="34" charset="0"/>
+              <a:buChar char="•"/>
+            </a:pPr>
+            <a:endParaRPr lang="fr-FR" dirty="0"/>
+          </a:p>
+        </p:txBody>
+      </p:sp>
+    </p:spTree>
+    <p:extLst>
+      <p:ext uri="{BB962C8B-B14F-4D97-AF65-F5344CB8AC3E}">
+        <p14:creationId xmlns:p14="http://schemas.microsoft.com/office/powerpoint/2010/main" val="2484079345"/>
+      </p:ext>
+    </p:extLst>
+  </p:cSld>
+  <p:clrMapOvr>
+    <a:masterClrMapping/>
+  </p:clrMapOvr>
+</p:sld>
+</file>
+
+<file path=ppt/slides/slide27.xml><?xml version="1.0" encoding="utf-8"?>
 <p:sld xmlns:a="http://schemas.openxmlformats.org/drawingml/2006/main" xmlns:r="http://schemas.openxmlformats.org/officeDocument/2006/relationships" xmlns:p="http://schemas.openxmlformats.org/presentationml/2006/main">
   <p:cSld>
     <p:spTree>
@@ -13851,6 +15276,12 @@
 </file>
 
 <file path=customXml/item2.xml><?xml version="1.0" encoding="utf-8"?>
+<p:properties xmlns:p="http://schemas.microsoft.com/office/2006/metadata/properties" xmlns:xsi="http://www.w3.org/2001/XMLSchema-instance" xmlns:pc="http://schemas.microsoft.com/office/infopath/2007/PartnerControls">
+  <documentManagement/>
+</p:properties>
+</file>
+
+<file path=customXml/item3.xml><?xml version="1.0" encoding="utf-8"?>
 <ct:contentTypeSchema xmlns:ct="http://schemas.microsoft.com/office/2006/metadata/contentType" xmlns:ma="http://schemas.microsoft.com/office/2006/metadata/properties/metaAttributes" ct:_="" ma:_="" ma:contentTypeName="Document" ma:contentTypeID="0x0101003B42BEE73716D74F813DF5C80B60F0B0" ma:contentTypeVersion="8" ma:contentTypeDescription="Crée un document." ma:contentTypeScope="" ma:versionID="264b3600e944d01ea98a462b8c028692">
   <xsd:schema xmlns:xsd="http://www.w3.org/2001/XMLSchema" xmlns:xs="http://www.w3.org/2001/XMLSchema" xmlns:p="http://schemas.microsoft.com/office/2006/metadata/properties" xmlns:ns2="a3b9b371-1c6a-41cd-a653-42d6abfd87b3" xmlns:ns3="44df9910-ab21-4010-a816-02cbe0b8aad6" targetNamespace="http://schemas.microsoft.com/office/2006/metadata/properties" ma:root="true" ma:fieldsID="858f0b061a4945091a3a4f01e2455272" ns2:_="" ns3:_="">
     <xsd:import namespace="a3b9b371-1c6a-41cd-a653-42d6abfd87b3"/>
@@ -14041,12 +15472,6 @@
 </ct:contentTypeSchema>
 </file>
 
-<file path=customXml/item3.xml><?xml version="1.0" encoding="utf-8"?>
-<p:properties xmlns:p="http://schemas.microsoft.com/office/2006/metadata/properties" xmlns:xsi="http://www.w3.org/2001/XMLSchema-instance" xmlns:pc="http://schemas.microsoft.com/office/infopath/2007/PartnerControls">
-  <documentManagement/>
-</p:properties>
-</file>
-
 <file path=customXml/itemProps1.xml><?xml version="1.0" encoding="utf-8"?>
 <ds:datastoreItem xmlns:ds="http://schemas.openxmlformats.org/officeDocument/2006/customXml" ds:itemID="{BFFD340B-4C2F-40B7-ACAC-8EC917B617D1}">
   <ds:schemaRefs>
@@ -14056,6 +15481,21 @@
 </file>
 
 <file path=customXml/itemProps2.xml><?xml version="1.0" encoding="utf-8"?>
+<ds:datastoreItem xmlns:ds="http://schemas.openxmlformats.org/officeDocument/2006/customXml" ds:itemID="{AEEDCACA-F958-4F43-A59D-0E773A983348}">
+  <ds:schemaRefs>
+    <ds:schemaRef ds:uri="http://purl.org/dc/dcmitype/"/>
+    <ds:schemaRef ds:uri="http://schemas.microsoft.com/office/2006/documentManagement/types"/>
+    <ds:schemaRef ds:uri="http://www.w3.org/XML/1998/namespace"/>
+    <ds:schemaRef ds:uri="http://schemas.microsoft.com/office/2006/metadata/properties"/>
+    <ds:schemaRef ds:uri="http://schemas.openxmlformats.org/package/2006/metadata/core-properties"/>
+    <ds:schemaRef ds:uri="http://purl.org/dc/elements/1.1/"/>
+    <ds:schemaRef ds:uri="http://schemas.microsoft.com/office/infopath/2007/PartnerControls"/>
+    <ds:schemaRef ds:uri="http://purl.org/dc/terms/"/>
+  </ds:schemaRefs>
+</ds:datastoreItem>
+</file>
+
+<file path=customXml/itemProps3.xml><?xml version="1.0" encoding="utf-8"?>
 <ds:datastoreItem xmlns:ds="http://schemas.openxmlformats.org/officeDocument/2006/customXml" ds:itemID="{53FE1518-1664-448F-8B7F-1375EECB5E2F}">
   <ds:schemaRefs>
     <ds:schemaRef ds:uri="http://schemas.microsoft.com/office/2006/metadata/contentType"/>
@@ -14072,19 +15512,4 @@
     <ds:schemaRef ds:uri="http://schemas.microsoft.com/internal/obd"/>
   </ds:schemaRefs>
 </ds:datastoreItem>
-</file>
-
-<file path=customXml/itemProps3.xml><?xml version="1.0" encoding="utf-8"?>
-<ds:datastoreItem xmlns:ds="http://schemas.openxmlformats.org/officeDocument/2006/customXml" ds:itemID="{AEEDCACA-F958-4F43-A59D-0E773A983348}">
-  <ds:schemaRefs>
-    <ds:schemaRef ds:uri="http://purl.org/dc/dcmitype/"/>
-    <ds:schemaRef ds:uri="http://schemas.microsoft.com/office/2006/documentManagement/types"/>
-    <ds:schemaRef ds:uri="http://www.w3.org/XML/1998/namespace"/>
-    <ds:schemaRef ds:uri="http://schemas.microsoft.com/office/2006/metadata/properties"/>
-    <ds:schemaRef ds:uri="http://schemas.openxmlformats.org/package/2006/metadata/core-properties"/>
-    <ds:schemaRef ds:uri="http://purl.org/dc/elements/1.1/"/>
-    <ds:schemaRef ds:uri="http://schemas.microsoft.com/office/infopath/2007/PartnerControls"/>
-    <ds:schemaRef ds:uri="http://purl.org/dc/terms/"/>
-  </ds:schemaRefs>
-</ds:datastoreItem>
 </file>
</xml_diff>

<commit_message>
Do corrections on powerpoint
</commit_message>
<xml_diff>
--- a/ObjectCalisthenics.pptx
+++ b/ObjectCalisthenics.pptx
@@ -8398,14 +8398,14 @@
         <a:lstStyle/>
         <a:p>
           <a:r>
-            <a:rPr lang="fr-FR" b="1"/>
+            <a:rPr lang="fr-FR" b="1" dirty="0"/>
             <a:t>Injecter</a:t>
           </a:r>
           <a:r>
-            <a:rPr lang="fr-FR"/>
-            <a:t> l’implémentation d’une implémentation en dehors de l’objet consommateur.</a:t>
+            <a:rPr lang="fr-FR" dirty="0"/>
+            <a:t> l’implémentation d’une interface en dehors de l’objet consommateur.</a:t>
           </a:r>
-          <a:endParaRPr lang="en-US"/>
+          <a:endParaRPr lang="en-US" dirty="0"/>
         </a:p>
       </dgm:t>
     </dgm:pt>
@@ -11382,14 +11382,14 @@
             <a:buNone/>
           </a:pPr>
           <a:r>
-            <a:rPr lang="fr-FR" sz="1300" b="1" kern="1200"/>
+            <a:rPr lang="fr-FR" sz="1300" b="1" kern="1200" dirty="0"/>
             <a:t>Injecter</a:t>
           </a:r>
           <a:r>
-            <a:rPr lang="fr-FR" sz="1300" kern="1200"/>
-            <a:t> l’implémentation d’une implémentation en dehors de l’objet consommateur.</a:t>
+            <a:rPr lang="fr-FR" sz="1300" kern="1200" dirty="0"/>
+            <a:t> l’implémentation d’une interface en dehors de l’objet consommateur.</a:t>
           </a:r>
-          <a:endParaRPr lang="en-US" sz="1300" kern="1200"/>
+          <a:endParaRPr lang="en-US" sz="1300" kern="1200" dirty="0"/>
         </a:p>
       </dsp:txBody>
       <dsp:txXfrm>
@@ -28891,7 +28891,7 @@
           <p:nvPr>
             <p:extLst>
               <p:ext uri="{D42A27DB-BD31-4B8C-83A1-F6EECF244321}">
-                <p14:modId xmlns:p14="http://schemas.microsoft.com/office/powerpoint/2010/main" val="292408685"/>
+                <p14:modId xmlns:p14="http://schemas.microsoft.com/office/powerpoint/2010/main" val="1432507480"/>
               </p:ext>
             </p:extLst>
           </p:nvPr>
@@ -29404,12 +29404,12 @@
               <a:t>d'</a:t>
             </a:r>
             <a:r>
-              <a:rPr lang="fr-FR" b="1" dirty="0" err="1">
+              <a:rPr lang="fr-FR" b="1" dirty="0">
                 <a:solidFill>
                   <a:schemeClr val="tx1"/>
                 </a:solidFill>
               </a:rPr>
-              <a:t>abrévation</a:t>
+              <a:t>abréviation</a:t>
             </a:r>
             <a:endParaRPr lang="fr-FR" b="1" dirty="0"/>
           </a:p>
@@ -31027,12 +31027,8 @@
           <a:lstStyle/>
           <a:p>
             <a:r>
-              <a:rPr lang="fr-FR" dirty="0"/>
-              <a:t>Pas d'</a:t>
-            </a:r>
-            <a:r>
-              <a:rPr lang="fr-FR" dirty="0" err="1"/>
-              <a:t>abrévation</a:t>
+              <a:rPr lang="fr-FR"/>
+              <a:t>Pas d'abréviation</a:t>
             </a:r>
             <a:endParaRPr lang="fr-FR" dirty="0"/>
           </a:p>
@@ -36202,6 +36198,21 @@
 </file>
 
 <file path=customXml/item1.xml><?xml version="1.0" encoding="utf-8"?>
+<p:properties xmlns:p="http://schemas.microsoft.com/office/2006/metadata/properties" xmlns:xsi="http://www.w3.org/2001/XMLSchema-instance" xmlns:pc="http://schemas.microsoft.com/office/infopath/2007/PartnerControls">
+  <documentManagement/>
+</p:properties>
+</file>
+
+<file path=customXml/item2.xml><?xml version="1.0" encoding="utf-8"?>
+<?mso-contentType ?>
+<FormTemplates xmlns="http://schemas.microsoft.com/sharepoint/v3/contenttype/forms">
+  <Display>DocumentLibraryForm</Display>
+  <Edit>DocumentLibraryForm</Edit>
+  <New>DocumentLibraryForm</New>
+</FormTemplates>
+</file>
+
+<file path=customXml/item3.xml><?xml version="1.0" encoding="utf-8"?>
 <ct:contentTypeSchema xmlns:ct="http://schemas.microsoft.com/office/2006/metadata/contentType" xmlns:ma="http://schemas.microsoft.com/office/2006/metadata/properties/metaAttributes" ct:_="" ma:_="" ma:contentTypeName="Document" ma:contentTypeID="0x0101003B42BEE73716D74F813DF5C80B60F0B0" ma:contentTypeVersion="8" ma:contentTypeDescription="Crée un document." ma:contentTypeScope="" ma:versionID="264b3600e944d01ea98a462b8c028692">
   <xsd:schema xmlns:xsd="http://www.w3.org/2001/XMLSchema" xmlns:xs="http://www.w3.org/2001/XMLSchema" xmlns:p="http://schemas.microsoft.com/office/2006/metadata/properties" xmlns:ns2="a3b9b371-1c6a-41cd-a653-42d6abfd87b3" xmlns:ns3="44df9910-ab21-4010-a816-02cbe0b8aad6" targetNamespace="http://schemas.microsoft.com/office/2006/metadata/properties" ma:root="true" ma:fieldsID="858f0b061a4945091a3a4f01e2455272" ns2:_="" ns3:_="">
     <xsd:import namespace="a3b9b371-1c6a-41cd-a653-42d6abfd87b3"/>
@@ -36392,22 +36403,30 @@
 </ct:contentTypeSchema>
 </file>
 
-<file path=customXml/item2.xml><?xml version="1.0" encoding="utf-8"?>
-<?mso-contentType ?>
-<FormTemplates xmlns="http://schemas.microsoft.com/sharepoint/v3/contenttype/forms">
-  <Display>DocumentLibraryForm</Display>
-  <Edit>DocumentLibraryForm</Edit>
-  <New>DocumentLibraryForm</New>
-</FormTemplates>
+<file path=customXml/itemProps1.xml><?xml version="1.0" encoding="utf-8"?>
+<ds:datastoreItem xmlns:ds="http://schemas.openxmlformats.org/officeDocument/2006/customXml" ds:itemID="{AEEDCACA-F958-4F43-A59D-0E773A983348}">
+  <ds:schemaRefs>
+    <ds:schemaRef ds:uri="http://purl.org/dc/dcmitype/"/>
+    <ds:schemaRef ds:uri="http://schemas.microsoft.com/office/2006/documentManagement/types"/>
+    <ds:schemaRef ds:uri="http://www.w3.org/XML/1998/namespace"/>
+    <ds:schemaRef ds:uri="http://schemas.microsoft.com/office/2006/metadata/properties"/>
+    <ds:schemaRef ds:uri="http://schemas.openxmlformats.org/package/2006/metadata/core-properties"/>
+    <ds:schemaRef ds:uri="http://purl.org/dc/elements/1.1/"/>
+    <ds:schemaRef ds:uri="http://schemas.microsoft.com/office/infopath/2007/PartnerControls"/>
+    <ds:schemaRef ds:uri="http://purl.org/dc/terms/"/>
+  </ds:schemaRefs>
+</ds:datastoreItem>
 </file>
 
-<file path=customXml/item3.xml><?xml version="1.0" encoding="utf-8"?>
-<p:properties xmlns:p="http://schemas.microsoft.com/office/2006/metadata/properties" xmlns:xsi="http://www.w3.org/2001/XMLSchema-instance" xmlns:pc="http://schemas.microsoft.com/office/infopath/2007/PartnerControls">
-  <documentManagement/>
-</p:properties>
+<file path=customXml/itemProps2.xml><?xml version="1.0" encoding="utf-8"?>
+<ds:datastoreItem xmlns:ds="http://schemas.openxmlformats.org/officeDocument/2006/customXml" ds:itemID="{BFFD340B-4C2F-40B7-ACAC-8EC917B617D1}">
+  <ds:schemaRefs>
+    <ds:schemaRef ds:uri="http://schemas.microsoft.com/sharepoint/v3/contenttype/forms"/>
+  </ds:schemaRefs>
+</ds:datastoreItem>
 </file>
 
-<file path=customXml/itemProps1.xml><?xml version="1.0" encoding="utf-8"?>
+<file path=customXml/itemProps3.xml><?xml version="1.0" encoding="utf-8"?>
 <ds:datastoreItem xmlns:ds="http://schemas.openxmlformats.org/officeDocument/2006/customXml" ds:itemID="{53FE1518-1664-448F-8B7F-1375EECB5E2F}">
   <ds:schemaRefs>
     <ds:schemaRef ds:uri="http://schemas.microsoft.com/office/2006/metadata/contentType"/>
@@ -36424,27 +36443,4 @@
     <ds:schemaRef ds:uri="http://schemas.microsoft.com/internal/obd"/>
   </ds:schemaRefs>
 </ds:datastoreItem>
-</file>
-
-<file path=customXml/itemProps2.xml><?xml version="1.0" encoding="utf-8"?>
-<ds:datastoreItem xmlns:ds="http://schemas.openxmlformats.org/officeDocument/2006/customXml" ds:itemID="{BFFD340B-4C2F-40B7-ACAC-8EC917B617D1}">
-  <ds:schemaRefs>
-    <ds:schemaRef ds:uri="http://schemas.microsoft.com/sharepoint/v3/contenttype/forms"/>
-  </ds:schemaRefs>
-</ds:datastoreItem>
-</file>
-
-<file path=customXml/itemProps3.xml><?xml version="1.0" encoding="utf-8"?>
-<ds:datastoreItem xmlns:ds="http://schemas.openxmlformats.org/officeDocument/2006/customXml" ds:itemID="{AEEDCACA-F958-4F43-A59D-0E773A983348}">
-  <ds:schemaRefs>
-    <ds:schemaRef ds:uri="http://purl.org/dc/dcmitype/"/>
-    <ds:schemaRef ds:uri="http://schemas.microsoft.com/office/2006/documentManagement/types"/>
-    <ds:schemaRef ds:uri="http://www.w3.org/XML/1998/namespace"/>
-    <ds:schemaRef ds:uri="http://schemas.microsoft.com/office/2006/metadata/properties"/>
-    <ds:schemaRef ds:uri="http://schemas.openxmlformats.org/package/2006/metadata/core-properties"/>
-    <ds:schemaRef ds:uri="http://purl.org/dc/elements/1.1/"/>
-    <ds:schemaRef ds:uri="http://schemas.microsoft.com/office/infopath/2007/PartnerControls"/>
-    <ds:schemaRef ds:uri="http://purl.org/dc/terms/"/>
-  </ds:schemaRefs>
-</ds:datastoreItem>
 </file>
</xml_diff>